<commit_message>
Update figure, legacy-import -> curated-import
[ci skip]
</commit_message>
<xml_diff>
--- a/docs/images/default-database.pptx
+++ b/docs/images/default-database.pptx
@@ -259,7 +259,7 @@
           <a:p>
             <a:fld id="{9BF4B002-F650-8A49-9257-AF48A4E75ECF}" type="datetimeFigureOut">
               <a:rPr lang="en-US" smtClean="0"/>
-              <a:t>7/1/19</a:t>
+              <a:t>11/11/19</a:t>
             </a:fld>
             <a:endParaRPr lang="en-US"/>
           </a:p>
@@ -457,7 +457,7 @@
           <a:p>
             <a:fld id="{9BF4B002-F650-8A49-9257-AF48A4E75ECF}" type="datetimeFigureOut">
               <a:rPr lang="en-US" smtClean="0"/>
-              <a:t>7/1/19</a:t>
+              <a:t>11/11/19</a:t>
             </a:fld>
             <a:endParaRPr lang="en-US"/>
           </a:p>
@@ -665,7 +665,7 @@
           <a:p>
             <a:fld id="{9BF4B002-F650-8A49-9257-AF48A4E75ECF}" type="datetimeFigureOut">
               <a:rPr lang="en-US" smtClean="0"/>
-              <a:t>7/1/19</a:t>
+              <a:t>11/11/19</a:t>
             </a:fld>
             <a:endParaRPr lang="en-US"/>
           </a:p>
@@ -863,7 +863,7 @@
           <a:p>
             <a:fld id="{9BF4B002-F650-8A49-9257-AF48A4E75ECF}" type="datetimeFigureOut">
               <a:rPr lang="en-US" smtClean="0"/>
-              <a:t>7/1/19</a:t>
+              <a:t>11/11/19</a:t>
             </a:fld>
             <a:endParaRPr lang="en-US"/>
           </a:p>
@@ -1138,7 +1138,7 @@
           <a:p>
             <a:fld id="{9BF4B002-F650-8A49-9257-AF48A4E75ECF}" type="datetimeFigureOut">
               <a:rPr lang="en-US" smtClean="0"/>
-              <a:t>7/1/19</a:t>
+              <a:t>11/11/19</a:t>
             </a:fld>
             <a:endParaRPr lang="en-US"/>
           </a:p>
@@ -1403,7 +1403,7 @@
           <a:p>
             <a:fld id="{9BF4B002-F650-8A49-9257-AF48A4E75ECF}" type="datetimeFigureOut">
               <a:rPr lang="en-US" smtClean="0"/>
-              <a:t>7/1/19</a:t>
+              <a:t>11/11/19</a:t>
             </a:fld>
             <a:endParaRPr lang="en-US"/>
           </a:p>
@@ -1815,7 +1815,7 @@
           <a:p>
             <a:fld id="{9BF4B002-F650-8A49-9257-AF48A4E75ECF}" type="datetimeFigureOut">
               <a:rPr lang="en-US" smtClean="0"/>
-              <a:t>7/1/19</a:t>
+              <a:t>11/11/19</a:t>
             </a:fld>
             <a:endParaRPr lang="en-US"/>
           </a:p>
@@ -1956,7 +1956,7 @@
           <a:p>
             <a:fld id="{9BF4B002-F650-8A49-9257-AF48A4E75ECF}" type="datetimeFigureOut">
               <a:rPr lang="en-US" smtClean="0"/>
-              <a:t>7/1/19</a:t>
+              <a:t>11/11/19</a:t>
             </a:fld>
             <a:endParaRPr lang="en-US"/>
           </a:p>
@@ -2069,7 +2069,7 @@
           <a:p>
             <a:fld id="{9BF4B002-F650-8A49-9257-AF48A4E75ECF}" type="datetimeFigureOut">
               <a:rPr lang="en-US" smtClean="0"/>
-              <a:t>7/1/19</a:t>
+              <a:t>11/11/19</a:t>
             </a:fld>
             <a:endParaRPr lang="en-US"/>
           </a:p>
@@ -2380,7 +2380,7 @@
           <a:p>
             <a:fld id="{9BF4B002-F650-8A49-9257-AF48A4E75ECF}" type="datetimeFigureOut">
               <a:rPr lang="en-US" smtClean="0"/>
-              <a:t>7/1/19</a:t>
+              <a:t>11/11/19</a:t>
             </a:fld>
             <a:endParaRPr lang="en-US"/>
           </a:p>
@@ -2668,7 +2668,7 @@
           <a:p>
             <a:fld id="{9BF4B002-F650-8A49-9257-AF48A4E75ECF}" type="datetimeFigureOut">
               <a:rPr lang="en-US" smtClean="0"/>
-              <a:t>7/1/19</a:t>
+              <a:t>11/11/19</a:t>
             </a:fld>
             <a:endParaRPr lang="en-US"/>
           </a:p>
@@ -2909,7 +2909,7 @@
           <a:p>
             <a:fld id="{9BF4B002-F650-8A49-9257-AF48A4E75ECF}" type="datetimeFigureOut">
               <a:rPr lang="en-US" smtClean="0"/>
-              <a:t>7/1/19</a:t>
+              <a:t>11/11/19</a:t>
             </a:fld>
             <a:endParaRPr lang="en-US"/>
           </a:p>
@@ -3340,7 +3340,7 @@
         </p:nvSpPr>
         <p:spPr>
           <a:xfrm>
-            <a:off x="8007952" y="155169"/>
+            <a:off x="8097060" y="161893"/>
             <a:ext cx="1426678" cy="1288871"/>
           </a:xfrm>
           <a:prstGeom prst="roundRect">
@@ -3408,7 +3408,7 @@
         </p:nvSpPr>
         <p:spPr>
           <a:xfrm>
-            <a:off x="6497976" y="155169"/>
+            <a:off x="6539168" y="161893"/>
             <a:ext cx="1425600" cy="1288871"/>
           </a:xfrm>
           <a:prstGeom prst="roundRect">
@@ -3476,7 +3476,7 @@
         </p:nvSpPr>
         <p:spPr>
           <a:xfrm>
-            <a:off x="2056015" y="155169"/>
+            <a:off x="2062739" y="161893"/>
             <a:ext cx="4334318" cy="1288871"/>
           </a:xfrm>
           <a:prstGeom prst="roundRect">
@@ -3548,7 +3548,7 @@
         </p:nvCxnSpPr>
         <p:spPr>
           <a:xfrm flipH="1">
-            <a:off x="5774987" y="466613"/>
+            <a:off x="5781711" y="473337"/>
             <a:ext cx="3521" cy="2125076"/>
           </a:xfrm>
           <a:prstGeom prst="straightConnector1">
@@ -3585,13 +3585,12 @@
           <p:cNvCxnSpPr>
             <a:cxnSpLocks/>
             <a:stCxn id="146" idx="0"/>
-            <a:endCxn id="43" idx="0"/>
           </p:cNvCxnSpPr>
           <p:nvPr/>
         </p:nvCxnSpPr>
         <p:spPr>
           <a:xfrm>
-            <a:off x="8727037" y="500696"/>
+            <a:off x="8816145" y="507420"/>
             <a:ext cx="0" cy="2090993"/>
           </a:xfrm>
           <a:prstGeom prst="straightConnector1">
@@ -3630,7 +3629,7 @@
         </p:nvSpPr>
         <p:spPr>
           <a:xfrm>
-            <a:off x="2346324" y="2176893"/>
+            <a:off x="2353048" y="2183617"/>
             <a:ext cx="2221713" cy="1348629"/>
           </a:xfrm>
           <a:prstGeom prst="roundRect">
@@ -3698,7 +3697,7 @@
         </p:nvSpPr>
         <p:spPr>
           <a:xfrm>
-            <a:off x="2166850" y="493216"/>
+            <a:off x="2173574" y="499940"/>
             <a:ext cx="1235041" cy="900000"/>
           </a:xfrm>
           <a:prstGeom prst="flowChartMultidocument">
@@ -3781,7 +3780,7 @@
         </p:nvSpPr>
         <p:spPr>
           <a:xfrm>
-            <a:off x="3656971" y="493216"/>
+            <a:off x="3663695" y="499940"/>
             <a:ext cx="1234800" cy="900000"/>
           </a:xfrm>
           <a:prstGeom prst="flowChartMultidocument">
@@ -3864,7 +3863,7 @@
         </p:nvSpPr>
         <p:spPr>
           <a:xfrm>
-            <a:off x="2588886" y="1745350"/>
+            <a:off x="2595610" y="1752074"/>
             <a:ext cx="1736591" cy="352215"/>
           </a:xfrm>
           <a:prstGeom prst="flowChartPredefinedProcess">
@@ -3919,7 +3918,7 @@
         </p:nvCxnSpPr>
         <p:spPr>
           <a:xfrm rot="5400000">
-            <a:off x="3629737" y="1186579"/>
+            <a:off x="3636461" y="1193303"/>
             <a:ext cx="386217" cy="731325"/>
           </a:xfrm>
           <a:prstGeom prst="bentConnector3">
@@ -3964,7 +3963,7 @@
         </p:nvCxnSpPr>
         <p:spPr>
           <a:xfrm rot="16200000" flipH="1">
-            <a:off x="2884727" y="1172894"/>
+            <a:off x="2891451" y="1179618"/>
             <a:ext cx="386217" cy="758693"/>
           </a:xfrm>
           <a:prstGeom prst="bentConnector3">
@@ -4009,7 +4008,7 @@
         </p:nvCxnSpPr>
         <p:spPr>
           <a:xfrm>
-            <a:off x="3457182" y="2097565"/>
+            <a:off x="3463906" y="2104289"/>
             <a:ext cx="0" cy="219835"/>
           </a:xfrm>
           <a:prstGeom prst="straightConnector1">
@@ -4048,8 +4047,8 @@
         </p:nvSpPr>
         <p:spPr>
           <a:xfrm>
-            <a:off x="5878142" y="1775931"/>
-            <a:ext cx="2630032" cy="354625"/>
+            <a:off x="5869547" y="1782655"/>
+            <a:ext cx="2800287" cy="354625"/>
           </a:xfrm>
           <a:prstGeom prst="flowChartPredefinedProcess">
             <a:avLst/>
@@ -4080,7 +4079,7 @@
               <a:rPr lang="en-US" dirty="0">
                 <a:latin typeface="Andale Mono" panose="020B0509000000000004" pitchFamily="49" charset="0"/>
               </a:rPr>
-              <a:t>legacy-import</a:t>
+              <a:t>curated-import</a:t>
             </a:r>
           </a:p>
         </p:txBody>
@@ -4096,15 +4095,13 @@
           </p:cNvPr>
           <p:cNvCxnSpPr>
             <a:cxnSpLocks/>
-            <a:stCxn id="55" idx="0"/>
-            <a:endCxn id="20" idx="0"/>
           </p:cNvCxnSpPr>
           <p:nvPr/>
         </p:nvCxnSpPr>
         <p:spPr>
           <a:xfrm>
-            <a:off x="7189425" y="511613"/>
-            <a:ext cx="3733" cy="1264318"/>
+            <a:off x="7244913" y="518337"/>
+            <a:ext cx="18054" cy="1264318"/>
           </a:xfrm>
           <a:prstGeom prst="straightConnector1">
             <a:avLst/>
@@ -4142,7 +4139,7 @@
         </p:nvSpPr>
         <p:spPr>
           <a:xfrm>
-            <a:off x="6131769" y="3220727"/>
+            <a:off x="6199857" y="3227451"/>
             <a:ext cx="2128058" cy="652838"/>
           </a:xfrm>
           <a:prstGeom prst="flowChartMagneticDrum">
@@ -4212,7 +4209,7 @@
         </p:nvSpPr>
         <p:spPr>
           <a:xfrm>
-            <a:off x="2469415" y="2317400"/>
+            <a:off x="2476139" y="2324124"/>
             <a:ext cx="1736592" cy="900000"/>
           </a:xfrm>
           <a:prstGeom prst="flowChartMultidocument">
@@ -4296,7 +4293,7 @@
         </p:nvSpPr>
         <p:spPr>
           <a:xfrm>
-            <a:off x="7557651" y="2591689"/>
+            <a:off x="7646759" y="2598413"/>
             <a:ext cx="2338771" cy="356232"/>
           </a:xfrm>
           <a:prstGeom prst="flowChartPredefinedProcess">
@@ -4356,9 +4353,9 @@
           <p:nvPr/>
         </p:nvCxnSpPr>
         <p:spPr>
-          <a:xfrm>
-            <a:off x="7193158" y="2130556"/>
-            <a:ext cx="2640" cy="1090171"/>
+          <a:xfrm flipH="1">
+            <a:off x="7263886" y="2137280"/>
+            <a:ext cx="5805" cy="1090171"/>
           </a:xfrm>
           <a:prstGeom prst="straightConnector1">
             <a:avLst/>
@@ -4396,7 +4393,7 @@
         </p:nvSpPr>
         <p:spPr>
           <a:xfrm>
-            <a:off x="4710958" y="2591689"/>
+            <a:off x="4717682" y="2598413"/>
             <a:ext cx="2128058" cy="352215"/>
           </a:xfrm>
           <a:prstGeom prst="flowChartPredefinedProcess">
@@ -4457,7 +4454,7 @@
         </p:nvCxnSpPr>
         <p:spPr>
           <a:xfrm>
-            <a:off x="4206007" y="2767400"/>
+            <a:off x="4212731" y="2774124"/>
             <a:ext cx="504951" cy="397"/>
           </a:xfrm>
           <a:prstGeom prst="straightConnector1">
@@ -4496,7 +4493,7 @@
         </p:nvSpPr>
         <p:spPr>
           <a:xfrm>
-            <a:off x="8109938" y="500696"/>
+            <a:off x="8199046" y="507420"/>
             <a:ext cx="1234198" cy="810000"/>
           </a:xfrm>
           <a:prstGeom prst="flowChartDocument">
@@ -4602,7 +4599,7 @@
         </p:nvSpPr>
         <p:spPr>
           <a:xfrm>
-            <a:off x="5076158" y="466613"/>
+            <a:off x="5082882" y="473337"/>
             <a:ext cx="1234800" cy="900000"/>
           </a:xfrm>
           <a:prstGeom prst="flowChartMultidocument">
@@ -4671,7 +4668,7 @@
         </p:nvSpPr>
         <p:spPr>
           <a:xfrm>
-            <a:off x="6572326" y="511613"/>
+            <a:off x="6634538" y="518337"/>
             <a:ext cx="1234198" cy="810000"/>
           </a:xfrm>
           <a:prstGeom prst="flowChartDocument">
@@ -4781,8 +4778,8 @@
         </p:nvCxnSpPr>
         <p:spPr>
           <a:xfrm rot="5400000">
-            <a:off x="7825015" y="2318705"/>
-            <a:ext cx="272806" cy="1531239"/>
+            <a:off x="7903613" y="2314919"/>
+            <a:ext cx="272806" cy="1552259"/>
           </a:xfrm>
           <a:prstGeom prst="bentConnector3">
             <a:avLst>
@@ -4826,8 +4823,8 @@
         </p:nvCxnSpPr>
         <p:spPr>
           <a:xfrm rot="16200000" flipH="1">
-            <a:off x="6346981" y="2371909"/>
-            <a:ext cx="276823" cy="1420811"/>
+            <a:off x="6384387" y="2347951"/>
+            <a:ext cx="276823" cy="1482175"/>
           </a:xfrm>
           <a:prstGeom prst="bentConnector3">
             <a:avLst>

</xml_diff>